<commit_message>
Minor milestone wording update
</commit_message>
<xml_diff>
--- a/Week02-04/M1_slides/Lab2_1.pptx
+++ b/Week02-04/M1_slides/Lab2_1.pptx
@@ -287,7 +287,7 @@
           <a:p>
             <a:fld id="{1205BC88-DBF0-4610-A802-A09E0A6ECD22}" type="datetimeFigureOut">
               <a:rPr lang="en-AU" smtClean="0"/>
-              <a:t>4/08/2025</a:t>
+              <a:t>5/08/2025</a:t>
             </a:fld>
             <a:endParaRPr lang="en-AU"/>
           </a:p>
@@ -515,7 +515,7 @@
           <a:p>
             <a:fld id="{1205BC88-DBF0-4610-A802-A09E0A6ECD22}" type="datetimeFigureOut">
               <a:rPr lang="en-AU" smtClean="0"/>
-              <a:t>4/08/2025</a:t>
+              <a:t>5/08/2025</a:t>
             </a:fld>
             <a:endParaRPr lang="en-AU"/>
           </a:p>
@@ -695,7 +695,7 @@
           <a:p>
             <a:fld id="{1205BC88-DBF0-4610-A802-A09E0A6ECD22}" type="datetimeFigureOut">
               <a:rPr lang="en-AU" smtClean="0"/>
-              <a:t>4/08/2025</a:t>
+              <a:t>5/08/2025</a:t>
             </a:fld>
             <a:endParaRPr lang="en-AU"/>
           </a:p>
@@ -865,7 +865,7 @@
           <a:p>
             <a:fld id="{1205BC88-DBF0-4610-A802-A09E0A6ECD22}" type="datetimeFigureOut">
               <a:rPr lang="en-AU" smtClean="0"/>
-              <a:t>4/08/2025</a:t>
+              <a:t>5/08/2025</a:t>
             </a:fld>
             <a:endParaRPr lang="en-AU"/>
           </a:p>
@@ -1119,7 +1119,7 @@
           <a:p>
             <a:fld id="{1205BC88-DBF0-4610-A802-A09E0A6ECD22}" type="datetimeFigureOut">
               <a:rPr lang="en-AU" smtClean="0"/>
-              <a:t>4/08/2025</a:t>
+              <a:t>5/08/2025</a:t>
             </a:fld>
             <a:endParaRPr lang="en-AU"/>
           </a:p>
@@ -1445,7 +1445,7 @@
           <a:p>
             <a:fld id="{1205BC88-DBF0-4610-A802-A09E0A6ECD22}" type="datetimeFigureOut">
               <a:rPr lang="en-AU" smtClean="0"/>
-              <a:t>4/08/2025</a:t>
+              <a:t>5/08/2025</a:t>
             </a:fld>
             <a:endParaRPr lang="en-AU"/>
           </a:p>
@@ -1896,7 +1896,7 @@
           <a:p>
             <a:fld id="{1205BC88-DBF0-4610-A802-A09E0A6ECD22}" type="datetimeFigureOut">
               <a:rPr lang="en-AU" smtClean="0"/>
-              <a:t>4/08/2025</a:t>
+              <a:t>5/08/2025</a:t>
             </a:fld>
             <a:endParaRPr lang="en-AU"/>
           </a:p>
@@ -2014,7 +2014,7 @@
           <a:p>
             <a:fld id="{1205BC88-DBF0-4610-A802-A09E0A6ECD22}" type="datetimeFigureOut">
               <a:rPr lang="en-AU" smtClean="0"/>
-              <a:t>4/08/2025</a:t>
+              <a:t>5/08/2025</a:t>
             </a:fld>
             <a:endParaRPr lang="en-AU"/>
           </a:p>
@@ -2109,7 +2109,7 @@
           <a:p>
             <a:fld id="{1205BC88-DBF0-4610-A802-A09E0A6ECD22}" type="datetimeFigureOut">
               <a:rPr lang="en-AU" smtClean="0"/>
-              <a:t>4/08/2025</a:t>
+              <a:t>5/08/2025</a:t>
             </a:fld>
             <a:endParaRPr lang="en-AU"/>
           </a:p>
@@ -2396,7 +2396,7 @@
           <a:p>
             <a:fld id="{1205BC88-DBF0-4610-A802-A09E0A6ECD22}" type="datetimeFigureOut">
               <a:rPr lang="en-AU" smtClean="0"/>
-              <a:t>4/08/2025</a:t>
+              <a:t>5/08/2025</a:t>
             </a:fld>
             <a:endParaRPr lang="en-AU"/>
           </a:p>
@@ -2718,7 +2718,7 @@
           <a:p>
             <a:fld id="{1205BC88-DBF0-4610-A802-A09E0A6ECD22}" type="datetimeFigureOut">
               <a:rPr lang="en-AU" smtClean="0"/>
-              <a:t>4/08/2025</a:t>
+              <a:t>5/08/2025</a:t>
             </a:fld>
             <a:endParaRPr lang="en-AU"/>
           </a:p>
@@ -2972,7 +2972,7 @@
           <a:p>
             <a:fld id="{1205BC88-DBF0-4610-A802-A09E0A6ECD22}" type="datetimeFigureOut">
               <a:rPr lang="en-AU" smtClean="0"/>
-              <a:t>4/08/2025</a:t>
+              <a:t>5/08/2025</a:t>
             </a:fld>
             <a:endParaRPr lang="en-AU"/>
           </a:p>
@@ -6691,8 +6691,8 @@
           </a:p>
         </p:txBody>
       </p:sp>
-      <mc:AlternateContent xmlns:mc="http://schemas.openxmlformats.org/markup-compatibility/2006" xmlns:a14="http://schemas.microsoft.com/office/drawing/2010/main">
-        <mc:Choice Requires="a14">
+      <mc:AlternateContent xmlns:mc="http://schemas.openxmlformats.org/markup-compatibility/2006">
+        <mc:Choice xmlns:a14="http://schemas.microsoft.com/office/drawing/2010/main" Requires="a14">
           <p:sp>
             <p:nvSpPr>
               <p:cNvPr id="4" name="TextBox 3">
@@ -6746,7 +6746,15 @@
               <a:p>
                 <a:r>
                   <a:rPr lang="en-US" dirty="0"/>
-                  <a:t>		(you’ll learn more about this in M3 / Week 5 workshop)</a:t>
+                  <a:t>		(you’ll learn more about this </a:t>
+                </a:r>
+                <a:r>
+                  <a:rPr lang="en-US"/>
+                  <a:t>in M2 </a:t>
+                </a:r>
+                <a:r>
+                  <a:rPr lang="en-US" dirty="0"/>
+                  <a:t>/ Week 5 workshop)</a:t>
                 </a:r>
               </a:p>
               <a:p>
@@ -7038,7 +7046,7 @@
             </p:txBody>
           </p:sp>
         </mc:Choice>
-        <mc:Fallback xmlns="">
+        <mc:Fallback>
           <p:sp>
             <p:nvSpPr>
               <p:cNvPr id="4" name="TextBox 3">
@@ -7064,7 +7072,7 @@
               <a:blipFill>
                 <a:blip r:embed="rId2"/>
                 <a:stretch>
-                  <a:fillRect l="-440" t="-785"/>
+                  <a:fillRect l="-423" t="-755" b="-1132"/>
                 </a:stretch>
               </a:blipFill>
             </p:spPr>
@@ -7073,7 +7081,7 @@
               <a:lstStyle/>
               <a:p>
                 <a:r>
-                  <a:rPr lang="en-US">
+                  <a:rPr lang="en-AU">
                     <a:noFill/>
                   </a:rPr>
                   <a:t> </a:t>

</xml_diff>